<commit_message>
edits to text incorporated, figures remain
</commit_message>
<xml_diff>
--- a/writeup/graphics/traversal_visit_algo_figure.pptx
+++ b/writeup/graphics/traversal_visit_algo_figure.pptx
@@ -2,12 +2,12 @@
 <file path=ppt/presentation.xml><?xml version="1.0" encoding="utf-8"?>
 <p:presentation xmlns:a="http://schemas.openxmlformats.org/drawingml/2006/main" xmlns:r="http://schemas.openxmlformats.org/officeDocument/2006/relationships" xmlns:p="http://schemas.openxmlformats.org/presentationml/2006/main" saveSubsetFonts="1" autoCompressPictures="0">
   <p:sldMasterIdLst>
-    <p:sldMasterId id="2147483660" r:id="rId1"/>
+    <p:sldMasterId id="2147483672" r:id="rId1"/>
   </p:sldMasterIdLst>
   <p:sldIdLst>
     <p:sldId id="256" r:id="rId2"/>
   </p:sldIdLst>
-  <p:sldSz cx="9144000" cy="6858000" type="screen4x3"/>
+  <p:sldSz cx="12192000" cy="6858000"/>
   <p:notesSz cx="6858000" cy="9144000"/>
   <p:defaultTextStyle>
     <a:defPPr>
@@ -141,8 +141,8 @@
         </p:nvSpPr>
         <p:spPr>
           <a:xfrm>
-            <a:off x="685800" y="1122363"/>
-            <a:ext cx="7772400" cy="2387600"/>
+            <a:off x="1524000" y="1122363"/>
+            <a:ext cx="9144000" cy="2387600"/>
           </a:xfrm>
         </p:spPr>
         <p:txBody>
@@ -173,8 +173,8 @@
         </p:nvSpPr>
         <p:spPr>
           <a:xfrm>
-            <a:off x="1143000" y="3602038"/>
-            <a:ext cx="6858000" cy="1655762"/>
+            <a:off x="1524000" y="3602038"/>
+            <a:ext cx="9144000" cy="1655762"/>
           </a:xfrm>
         </p:spPr>
         <p:txBody>
@@ -243,7 +243,7 @@
           <a:p>
             <a:fld id="{EF8A70D3-6BBA-A547-84FE-E9DA1B159F43}" type="datetimeFigureOut">
               <a:rPr lang="en-US" smtClean="0"/>
-              <a:t>2/9/16</a:t>
+              <a:t>3/7/16</a:t>
             </a:fld>
             <a:endParaRPr lang="en-US"/>
           </a:p>
@@ -294,7 +294,7 @@
     </p:spTree>
     <p:extLst>
       <p:ext uri="{BB962C8B-B14F-4D97-AF65-F5344CB8AC3E}">
-        <p14:creationId xmlns:p14="http://schemas.microsoft.com/office/powerpoint/2010/main" val="67388489"/>
+        <p14:creationId xmlns:p14="http://schemas.microsoft.com/office/powerpoint/2010/main" val="638010799"/>
       </p:ext>
     </p:extLst>
   </p:cSld>
@@ -413,7 +413,7 @@
           <a:p>
             <a:fld id="{EF8A70D3-6BBA-A547-84FE-E9DA1B159F43}" type="datetimeFigureOut">
               <a:rPr lang="en-US" smtClean="0"/>
-              <a:t>2/9/16</a:t>
+              <a:t>3/7/16</a:t>
             </a:fld>
             <a:endParaRPr lang="en-US"/>
           </a:p>
@@ -464,7 +464,7 @@
     </p:spTree>
     <p:extLst>
       <p:ext uri="{BB962C8B-B14F-4D97-AF65-F5344CB8AC3E}">
-        <p14:creationId xmlns:p14="http://schemas.microsoft.com/office/powerpoint/2010/main" val="799851921"/>
+        <p14:creationId xmlns:p14="http://schemas.microsoft.com/office/powerpoint/2010/main" val="1386512503"/>
       </p:ext>
     </p:extLst>
   </p:cSld>
@@ -503,8 +503,8 @@
         </p:nvSpPr>
         <p:spPr>
           <a:xfrm>
-            <a:off x="6543675" y="365125"/>
-            <a:ext cx="1971675" cy="5811838"/>
+            <a:off x="8724900" y="365125"/>
+            <a:ext cx="2628900" cy="5811838"/>
           </a:xfrm>
         </p:spPr>
         <p:txBody>
@@ -531,8 +531,8 @@
         </p:nvSpPr>
         <p:spPr>
           <a:xfrm>
-            <a:off x="628650" y="365125"/>
-            <a:ext cx="5800725" cy="5811838"/>
+            <a:off x="838200" y="365125"/>
+            <a:ext cx="7734300" cy="5811838"/>
           </a:xfrm>
         </p:spPr>
         <p:txBody>
@@ -593,7 +593,7 @@
           <a:p>
             <a:fld id="{EF8A70D3-6BBA-A547-84FE-E9DA1B159F43}" type="datetimeFigureOut">
               <a:rPr lang="en-US" smtClean="0"/>
-              <a:t>2/9/16</a:t>
+              <a:t>3/7/16</a:t>
             </a:fld>
             <a:endParaRPr lang="en-US"/>
           </a:p>
@@ -644,7 +644,7 @@
     </p:spTree>
     <p:extLst>
       <p:ext uri="{BB962C8B-B14F-4D97-AF65-F5344CB8AC3E}">
-        <p14:creationId xmlns:p14="http://schemas.microsoft.com/office/powerpoint/2010/main" val="2011089674"/>
+        <p14:creationId xmlns:p14="http://schemas.microsoft.com/office/powerpoint/2010/main" val="770584324"/>
       </p:ext>
     </p:extLst>
   </p:cSld>
@@ -763,7 +763,7 @@
           <a:p>
             <a:fld id="{EF8A70D3-6BBA-A547-84FE-E9DA1B159F43}" type="datetimeFigureOut">
               <a:rPr lang="en-US" smtClean="0"/>
-              <a:t>2/9/16</a:t>
+              <a:t>3/7/16</a:t>
             </a:fld>
             <a:endParaRPr lang="en-US"/>
           </a:p>
@@ -814,7 +814,7 @@
     </p:spTree>
     <p:extLst>
       <p:ext uri="{BB962C8B-B14F-4D97-AF65-F5344CB8AC3E}">
-        <p14:creationId xmlns:p14="http://schemas.microsoft.com/office/powerpoint/2010/main" val="874452654"/>
+        <p14:creationId xmlns:p14="http://schemas.microsoft.com/office/powerpoint/2010/main" val="661649322"/>
       </p:ext>
     </p:extLst>
   </p:cSld>
@@ -853,8 +853,8 @@
         </p:nvSpPr>
         <p:spPr>
           <a:xfrm>
-            <a:off x="623888" y="1709739"/>
-            <a:ext cx="7886700" cy="2852737"/>
+            <a:off x="831850" y="1709738"/>
+            <a:ext cx="10515600" cy="2852737"/>
           </a:xfrm>
         </p:spPr>
         <p:txBody>
@@ -885,8 +885,8 @@
         </p:nvSpPr>
         <p:spPr>
           <a:xfrm>
-            <a:off x="623888" y="4589464"/>
-            <a:ext cx="7886700" cy="1500187"/>
+            <a:off x="831850" y="4589463"/>
+            <a:ext cx="10515600" cy="1500187"/>
           </a:xfrm>
         </p:spPr>
         <p:txBody>
@@ -896,7 +896,9 @@
               <a:buNone/>
               <a:defRPr sz="2400">
                 <a:solidFill>
-                  <a:schemeClr val="tx1"/>
+                  <a:schemeClr val="tx1">
+                    <a:tint val="75000"/>
+                  </a:schemeClr>
                 </a:solidFill>
               </a:defRPr>
             </a:lvl1pPr>
@@ -1007,7 +1009,7 @@
           <a:p>
             <a:fld id="{EF8A70D3-6BBA-A547-84FE-E9DA1B159F43}" type="datetimeFigureOut">
               <a:rPr lang="en-US" smtClean="0"/>
-              <a:t>2/9/16</a:t>
+              <a:t>3/7/16</a:t>
             </a:fld>
             <a:endParaRPr lang="en-US"/>
           </a:p>
@@ -1058,7 +1060,7 @@
     </p:spTree>
     <p:extLst>
       <p:ext uri="{BB962C8B-B14F-4D97-AF65-F5344CB8AC3E}">
-        <p14:creationId xmlns:p14="http://schemas.microsoft.com/office/powerpoint/2010/main" val="1695159357"/>
+        <p14:creationId xmlns:p14="http://schemas.microsoft.com/office/powerpoint/2010/main" val="669830688"/>
       </p:ext>
     </p:extLst>
   </p:cSld>
@@ -1120,8 +1122,8 @@
         </p:nvSpPr>
         <p:spPr>
           <a:xfrm>
-            <a:off x="628650" y="1825625"/>
-            <a:ext cx="3886200" cy="4351338"/>
+            <a:off x="838200" y="1825625"/>
+            <a:ext cx="5181600" cy="4351338"/>
           </a:xfrm>
         </p:spPr>
         <p:txBody>
@@ -1177,8 +1179,8 @@
         </p:nvSpPr>
         <p:spPr>
           <a:xfrm>
-            <a:off x="4629150" y="1825625"/>
-            <a:ext cx="3886200" cy="4351338"/>
+            <a:off x="6172200" y="1825625"/>
+            <a:ext cx="5181600" cy="4351338"/>
           </a:xfrm>
         </p:spPr>
         <p:txBody>
@@ -1239,7 +1241,7 @@
           <a:p>
             <a:fld id="{EF8A70D3-6BBA-A547-84FE-E9DA1B159F43}" type="datetimeFigureOut">
               <a:rPr lang="en-US" smtClean="0"/>
-              <a:t>2/9/16</a:t>
+              <a:t>3/7/16</a:t>
             </a:fld>
             <a:endParaRPr lang="en-US"/>
           </a:p>
@@ -1290,7 +1292,7 @@
     </p:spTree>
     <p:extLst>
       <p:ext uri="{BB962C8B-B14F-4D97-AF65-F5344CB8AC3E}">
-        <p14:creationId xmlns:p14="http://schemas.microsoft.com/office/powerpoint/2010/main" val="2025251997"/>
+        <p14:creationId xmlns:p14="http://schemas.microsoft.com/office/powerpoint/2010/main" val="735095642"/>
       </p:ext>
     </p:extLst>
   </p:cSld>
@@ -1329,8 +1331,8 @@
         </p:nvSpPr>
         <p:spPr>
           <a:xfrm>
-            <a:off x="629841" y="365126"/>
-            <a:ext cx="7886700" cy="1325563"/>
+            <a:off x="839788" y="365125"/>
+            <a:ext cx="10515600" cy="1325563"/>
           </a:xfrm>
         </p:spPr>
         <p:txBody>
@@ -1357,8 +1359,8 @@
         </p:nvSpPr>
         <p:spPr>
           <a:xfrm>
-            <a:off x="629842" y="1681163"/>
-            <a:ext cx="3868340" cy="823912"/>
+            <a:off x="839788" y="1681163"/>
+            <a:ext cx="5157787" cy="823912"/>
           </a:xfrm>
         </p:spPr>
         <p:txBody>
@@ -1422,8 +1424,8 @@
         </p:nvSpPr>
         <p:spPr>
           <a:xfrm>
-            <a:off x="629842" y="2505075"/>
-            <a:ext cx="3868340" cy="3684588"/>
+            <a:off x="839788" y="2505075"/>
+            <a:ext cx="5157787" cy="3684588"/>
           </a:xfrm>
         </p:spPr>
         <p:txBody>
@@ -1479,8 +1481,8 @@
         </p:nvSpPr>
         <p:spPr>
           <a:xfrm>
-            <a:off x="4629150" y="1681163"/>
-            <a:ext cx="3887391" cy="823912"/>
+            <a:off x="6172200" y="1681163"/>
+            <a:ext cx="5183188" cy="823912"/>
           </a:xfrm>
         </p:spPr>
         <p:txBody>
@@ -1544,8 +1546,8 @@
         </p:nvSpPr>
         <p:spPr>
           <a:xfrm>
-            <a:off x="4629150" y="2505075"/>
-            <a:ext cx="3887391" cy="3684588"/>
+            <a:off x="6172200" y="2505075"/>
+            <a:ext cx="5183188" cy="3684588"/>
           </a:xfrm>
         </p:spPr>
         <p:txBody>
@@ -1606,7 +1608,7 @@
           <a:p>
             <a:fld id="{EF8A70D3-6BBA-A547-84FE-E9DA1B159F43}" type="datetimeFigureOut">
               <a:rPr lang="en-US" smtClean="0"/>
-              <a:t>2/9/16</a:t>
+              <a:t>3/7/16</a:t>
             </a:fld>
             <a:endParaRPr lang="en-US"/>
           </a:p>
@@ -1657,7 +1659,7 @@
     </p:spTree>
     <p:extLst>
       <p:ext uri="{BB962C8B-B14F-4D97-AF65-F5344CB8AC3E}">
-        <p14:creationId xmlns:p14="http://schemas.microsoft.com/office/powerpoint/2010/main" val="794508629"/>
+        <p14:creationId xmlns:p14="http://schemas.microsoft.com/office/powerpoint/2010/main" val="279033903"/>
       </p:ext>
     </p:extLst>
   </p:cSld>
@@ -1724,7 +1726,7 @@
           <a:p>
             <a:fld id="{EF8A70D3-6BBA-A547-84FE-E9DA1B159F43}" type="datetimeFigureOut">
               <a:rPr lang="en-US" smtClean="0"/>
-              <a:t>2/9/16</a:t>
+              <a:t>3/7/16</a:t>
             </a:fld>
             <a:endParaRPr lang="en-US"/>
           </a:p>
@@ -1775,7 +1777,7 @@
     </p:spTree>
     <p:extLst>
       <p:ext uri="{BB962C8B-B14F-4D97-AF65-F5344CB8AC3E}">
-        <p14:creationId xmlns:p14="http://schemas.microsoft.com/office/powerpoint/2010/main" val="253210557"/>
+        <p14:creationId xmlns:p14="http://schemas.microsoft.com/office/powerpoint/2010/main" val="1766006320"/>
       </p:ext>
     </p:extLst>
   </p:cSld>
@@ -1819,7 +1821,7 @@
           <a:p>
             <a:fld id="{EF8A70D3-6BBA-A547-84FE-E9DA1B159F43}" type="datetimeFigureOut">
               <a:rPr lang="en-US" smtClean="0"/>
-              <a:t>2/9/16</a:t>
+              <a:t>3/7/16</a:t>
             </a:fld>
             <a:endParaRPr lang="en-US"/>
           </a:p>
@@ -1870,7 +1872,7 @@
     </p:spTree>
     <p:extLst>
       <p:ext uri="{BB962C8B-B14F-4D97-AF65-F5344CB8AC3E}">
-        <p14:creationId xmlns:p14="http://schemas.microsoft.com/office/powerpoint/2010/main" val="1544726792"/>
+        <p14:creationId xmlns:p14="http://schemas.microsoft.com/office/powerpoint/2010/main" val="896735053"/>
       </p:ext>
     </p:extLst>
   </p:cSld>
@@ -1909,8 +1911,8 @@
         </p:nvSpPr>
         <p:spPr>
           <a:xfrm>
-            <a:off x="629841" y="457200"/>
-            <a:ext cx="2949178" cy="1600200"/>
+            <a:off x="839788" y="457200"/>
+            <a:ext cx="3932237" cy="1600200"/>
           </a:xfrm>
         </p:spPr>
         <p:txBody>
@@ -1941,8 +1943,8 @@
         </p:nvSpPr>
         <p:spPr>
           <a:xfrm>
-            <a:off x="3887391" y="987426"/>
-            <a:ext cx="4629150" cy="4873625"/>
+            <a:off x="5183188" y="987425"/>
+            <a:ext cx="6172200" cy="4873625"/>
           </a:xfrm>
         </p:spPr>
         <p:txBody>
@@ -2026,8 +2028,8 @@
         </p:nvSpPr>
         <p:spPr>
           <a:xfrm>
-            <a:off x="629841" y="2057400"/>
-            <a:ext cx="2949178" cy="3811588"/>
+            <a:off x="839788" y="2057400"/>
+            <a:ext cx="3932237" cy="3811588"/>
           </a:xfrm>
         </p:spPr>
         <p:txBody>
@@ -2096,7 +2098,7 @@
           <a:p>
             <a:fld id="{EF8A70D3-6BBA-A547-84FE-E9DA1B159F43}" type="datetimeFigureOut">
               <a:rPr lang="en-US" smtClean="0"/>
-              <a:t>2/9/16</a:t>
+              <a:t>3/7/16</a:t>
             </a:fld>
             <a:endParaRPr lang="en-US"/>
           </a:p>
@@ -2147,7 +2149,7 @@
     </p:spTree>
     <p:extLst>
       <p:ext uri="{BB962C8B-B14F-4D97-AF65-F5344CB8AC3E}">
-        <p14:creationId xmlns:p14="http://schemas.microsoft.com/office/powerpoint/2010/main" val="1293384561"/>
+        <p14:creationId xmlns:p14="http://schemas.microsoft.com/office/powerpoint/2010/main" val="385801125"/>
       </p:ext>
     </p:extLst>
   </p:cSld>
@@ -2186,8 +2188,8 @@
         </p:nvSpPr>
         <p:spPr>
           <a:xfrm>
-            <a:off x="629841" y="457200"/>
-            <a:ext cx="2949178" cy="1600200"/>
+            <a:off x="839788" y="457200"/>
+            <a:ext cx="3932237" cy="1600200"/>
           </a:xfrm>
         </p:spPr>
         <p:txBody>
@@ -2218,8 +2220,8 @@
         </p:nvSpPr>
         <p:spPr>
           <a:xfrm>
-            <a:off x="3887391" y="987426"/>
-            <a:ext cx="4629150" cy="4873625"/>
+            <a:off x="5183188" y="987425"/>
+            <a:ext cx="6172200" cy="4873625"/>
           </a:xfrm>
         </p:spPr>
         <p:txBody>
@@ -2283,8 +2285,8 @@
         </p:nvSpPr>
         <p:spPr>
           <a:xfrm>
-            <a:off x="629841" y="2057400"/>
-            <a:ext cx="2949178" cy="3811588"/>
+            <a:off x="839788" y="2057400"/>
+            <a:ext cx="3932237" cy="3811588"/>
           </a:xfrm>
         </p:spPr>
         <p:txBody>
@@ -2353,7 +2355,7 @@
           <a:p>
             <a:fld id="{EF8A70D3-6BBA-A547-84FE-E9DA1B159F43}" type="datetimeFigureOut">
               <a:rPr lang="en-US" smtClean="0"/>
-              <a:t>2/9/16</a:t>
+              <a:t>3/7/16</a:t>
             </a:fld>
             <a:endParaRPr lang="en-US"/>
           </a:p>
@@ -2404,7 +2406,7 @@
     </p:spTree>
     <p:extLst>
       <p:ext uri="{BB962C8B-B14F-4D97-AF65-F5344CB8AC3E}">
-        <p14:creationId xmlns:p14="http://schemas.microsoft.com/office/powerpoint/2010/main" val="1084841793"/>
+        <p14:creationId xmlns:p14="http://schemas.microsoft.com/office/powerpoint/2010/main" val="906377582"/>
       </p:ext>
     </p:extLst>
   </p:cSld>
@@ -2448,8 +2450,8 @@
         </p:nvSpPr>
         <p:spPr>
           <a:xfrm>
-            <a:off x="628650" y="365126"/>
-            <a:ext cx="7886700" cy="1325563"/>
+            <a:off x="838200" y="365125"/>
+            <a:ext cx="10515600" cy="1325563"/>
           </a:xfrm>
           <a:prstGeom prst="rect">
             <a:avLst/>
@@ -2481,8 +2483,8 @@
         </p:nvSpPr>
         <p:spPr>
           <a:xfrm>
-            <a:off x="628650" y="1825625"/>
-            <a:ext cx="7886700" cy="4351338"/>
+            <a:off x="838200" y="1825625"/>
+            <a:ext cx="10515600" cy="4351338"/>
           </a:xfrm>
           <a:prstGeom prst="rect">
             <a:avLst/>
@@ -2543,8 +2545,8 @@
         </p:nvSpPr>
         <p:spPr>
           <a:xfrm>
-            <a:off x="628650" y="6356351"/>
-            <a:ext cx="2057400" cy="365125"/>
+            <a:off x="838200" y="6356350"/>
+            <a:ext cx="2743200" cy="365125"/>
           </a:xfrm>
           <a:prstGeom prst="rect">
             <a:avLst/>
@@ -2566,7 +2568,7 @@
           <a:p>
             <a:fld id="{EF8A70D3-6BBA-A547-84FE-E9DA1B159F43}" type="datetimeFigureOut">
               <a:rPr lang="en-US" smtClean="0"/>
-              <a:t>2/9/16</a:t>
+              <a:t>3/7/16</a:t>
             </a:fld>
             <a:endParaRPr lang="en-US"/>
           </a:p>
@@ -2584,8 +2586,8 @@
         </p:nvSpPr>
         <p:spPr>
           <a:xfrm>
-            <a:off x="3028950" y="6356351"/>
-            <a:ext cx="3086100" cy="365125"/>
+            <a:off x="4038600" y="6356350"/>
+            <a:ext cx="4114800" cy="365125"/>
           </a:xfrm>
           <a:prstGeom prst="rect">
             <a:avLst/>
@@ -2621,8 +2623,8 @@
         </p:nvSpPr>
         <p:spPr>
           <a:xfrm>
-            <a:off x="6457950" y="6356351"/>
-            <a:ext cx="2057400" cy="365125"/>
+            <a:off x="8610600" y="6356350"/>
+            <a:ext cx="2743200" cy="365125"/>
           </a:xfrm>
           <a:prstGeom prst="rect">
             <a:avLst/>
@@ -2653,23 +2655,23 @@
     </p:spTree>
     <p:extLst>
       <p:ext uri="{BB962C8B-B14F-4D97-AF65-F5344CB8AC3E}">
-        <p14:creationId xmlns:p14="http://schemas.microsoft.com/office/powerpoint/2010/main" val="1394392600"/>
+        <p14:creationId xmlns:p14="http://schemas.microsoft.com/office/powerpoint/2010/main" val="636092795"/>
       </p:ext>
     </p:extLst>
   </p:cSld>
   <p:clrMap bg1="lt1" tx1="dk1" bg2="lt2" tx2="dk2" accent1="accent1" accent2="accent2" accent3="accent3" accent4="accent4" accent5="accent5" accent6="accent6" hlink="hlink" folHlink="folHlink"/>
   <p:sldLayoutIdLst>
-    <p:sldLayoutId id="2147483661" r:id="rId1"/>
-    <p:sldLayoutId id="2147483662" r:id="rId2"/>
-    <p:sldLayoutId id="2147483663" r:id="rId3"/>
-    <p:sldLayoutId id="2147483664" r:id="rId4"/>
-    <p:sldLayoutId id="2147483665" r:id="rId5"/>
-    <p:sldLayoutId id="2147483666" r:id="rId6"/>
-    <p:sldLayoutId id="2147483667" r:id="rId7"/>
-    <p:sldLayoutId id="2147483668" r:id="rId8"/>
-    <p:sldLayoutId id="2147483669" r:id="rId9"/>
-    <p:sldLayoutId id="2147483670" r:id="rId10"/>
-    <p:sldLayoutId id="2147483671" r:id="rId11"/>
+    <p:sldLayoutId id="2147483673" r:id="rId1"/>
+    <p:sldLayoutId id="2147483674" r:id="rId2"/>
+    <p:sldLayoutId id="2147483675" r:id="rId3"/>
+    <p:sldLayoutId id="2147483676" r:id="rId4"/>
+    <p:sldLayoutId id="2147483677" r:id="rId5"/>
+    <p:sldLayoutId id="2147483678" r:id="rId6"/>
+    <p:sldLayoutId id="2147483679" r:id="rId7"/>
+    <p:sldLayoutId id="2147483680" r:id="rId8"/>
+    <p:sldLayoutId id="2147483681" r:id="rId9"/>
+    <p:sldLayoutId id="2147483682" r:id="rId10"/>
+    <p:sldLayoutId id="2147483683" r:id="rId11"/>
   </p:sldLayoutIdLst>
   <p:txStyles>
     <p:titleStyle>
@@ -2992,7 +2994,7 @@
         </p:blipFill>
         <p:spPr>
           <a:xfrm>
-            <a:off x="2896650" y="4051795"/>
+            <a:off x="2528049" y="3849773"/>
             <a:ext cx="3377796" cy="2682367"/>
           </a:xfrm>
           <a:prstGeom prst="rect">
@@ -3002,7 +3004,7 @@
       </p:pic>
       <p:pic>
         <p:nvPicPr>
-          <p:cNvPr id="6" name="Picture 5"/>
+          <p:cNvPr id="12" name="Picture 11"/>
           <p:cNvPicPr>
             <a:picLocks noChangeAspect="1"/>
           </p:cNvPicPr>
@@ -3016,13 +3018,13 @@
               </a:ext>
             </a:extLst>
           </a:blip>
-          <a:srcRect l="22891" t="23101" r="19744" b="23256"/>
+          <a:srcRect l="23025" t="26863" r="22786" b="22157"/>
           <a:stretch/>
         </p:blipFill>
         <p:spPr>
           <a:xfrm>
-            <a:off x="4249374" y="824098"/>
-            <a:ext cx="3110323" cy="2644157"/>
+            <a:off x="5670032" y="4034439"/>
+            <a:ext cx="3065930" cy="2622177"/>
           </a:xfrm>
           <a:prstGeom prst="rect">
             <a:avLst/>
@@ -3031,14 +3033,14 @@
       </p:pic>
       <p:sp>
         <p:nvSpPr>
-          <p:cNvPr id="7" name="TextBox 6"/>
+          <p:cNvPr id="13" name="TextBox 12"/>
           <p:cNvSpPr txBox="1"/>
           <p:nvPr/>
         </p:nvSpPr>
         <p:spPr>
           <a:xfrm>
-            <a:off x="2671960" y="59629"/>
-            <a:ext cx="4858777" cy="523220"/>
+            <a:off x="2855461" y="3536191"/>
+            <a:ext cx="2369623" cy="307777"/>
           </a:xfrm>
           <a:prstGeom prst="rect">
             <a:avLst/>
@@ -3046,35 +3048,119 @@
           <a:noFill/>
         </p:spPr>
         <p:txBody>
-          <a:bodyPr wrap="square" rtlCol="0">
+          <a:bodyPr wrap="none" rtlCol="0">
             <a:spAutoFit/>
           </a:bodyPr>
           <a:lstStyle/>
           <a:p>
             <a:r>
-              <a:rPr lang="en-US" sz="2800" dirty="0"/>
-              <a:t>Traversal Algorithm</a:t>
-            </a:r>
-            <a:endParaRPr lang="en-US" sz="2800" dirty="0"/>
+              <a:rPr lang="en-US" sz="1400" dirty="0"/>
+              <a:t>Visits Path starting at article A</a:t>
+            </a:r>
+          </a:p>
+        </p:txBody>
+      </p:sp>
+      <p:sp>
+        <p:nvSpPr>
+          <p:cNvPr id="14" name="TextBox 13"/>
+          <p:cNvSpPr txBox="1"/>
+          <p:nvPr/>
+        </p:nvSpPr>
+        <p:spPr>
+          <a:xfrm>
+            <a:off x="5794889" y="3536191"/>
+            <a:ext cx="2379241" cy="307777"/>
+          </a:xfrm>
+          <a:prstGeom prst="rect">
+            <a:avLst/>
+          </a:prstGeom>
+          <a:noFill/>
+        </p:spPr>
+        <p:txBody>
+          <a:bodyPr wrap="none" rtlCol="0">
+            <a:spAutoFit/>
+          </a:bodyPr>
+          <a:lstStyle/>
+          <a:p>
+            <a:r>
+              <a:rPr lang="en-US" sz="1400" dirty="0"/>
+              <a:t>Visits Path starting at article G</a:t>
+            </a:r>
+          </a:p>
+        </p:txBody>
+      </p:sp>
+      <p:pic>
+        <p:nvPicPr>
+          <p:cNvPr id="16" name="Picture 15"/>
+          <p:cNvPicPr/>
+          <p:nvPr/>
+        </p:nvPicPr>
+        <p:blipFill rotWithShape="1">
+          <a:blip r:embed="rId4">
+            <a:extLst>
+              <a:ext uri="{28A0092B-C50C-407E-A947-70E740481C1C}">
+                <a14:useLocalDpi xmlns:a14="http://schemas.microsoft.com/office/drawing/2010/main" val="0"/>
+              </a:ext>
+            </a:extLst>
+          </a:blip>
+          <a:srcRect t="15233"/>
+          <a:stretch/>
+        </p:blipFill>
+        <p:spPr>
+          <a:xfrm>
+            <a:off x="8860539" y="4162361"/>
+            <a:ext cx="2677795" cy="1924315"/>
+          </a:xfrm>
+          <a:prstGeom prst="rect">
+            <a:avLst/>
+          </a:prstGeom>
+        </p:spPr>
+      </p:pic>
+      <p:sp>
+        <p:nvSpPr>
+          <p:cNvPr id="17" name="TextBox 16"/>
+          <p:cNvSpPr txBox="1"/>
+          <p:nvPr/>
+        </p:nvSpPr>
+        <p:spPr>
+          <a:xfrm>
+            <a:off x="9086084" y="3536191"/>
+            <a:ext cx="2226700" cy="369332"/>
+          </a:xfrm>
+          <a:prstGeom prst="rect">
+            <a:avLst/>
+          </a:prstGeom>
+          <a:noFill/>
+        </p:spPr>
+        <p:txBody>
+          <a:bodyPr wrap="none" rtlCol="0">
+            <a:spAutoFit/>
+          </a:bodyPr>
+          <a:lstStyle/>
+          <a:p>
+            <a:r>
+              <a:rPr lang="en-US" dirty="0"/>
+              <a:t>Traversal Visits Matrix</a:t>
+            </a:r>
           </a:p>
         </p:txBody>
       </p:sp>
       <p:graphicFrame>
         <p:nvGraphicFramePr>
-          <p:cNvPr id="8" name="Table 7"/>
+          <p:cNvPr id="18" name="Table 17"/>
           <p:cNvGraphicFramePr>
             <a:graphicFrameLocks noGrp="1"/>
           </p:cNvGraphicFramePr>
           <p:nvPr>
             <p:extLst>
               <p:ext uri="{D42A27DB-BD31-4B8C-83A1-F6EECF244321}">
-                <p14:modId xmlns:p14="http://schemas.microsoft.com/office/powerpoint/2010/main" val="488446228"/>
+                <p14:modId xmlns:p14="http://schemas.microsoft.com/office/powerpoint/2010/main" val="1911821606"/>
               </p:ext>
             </p:extLst>
           </p:nvPr>
         </p:nvGraphicFramePr>
         <p:xfrm>
-          <a:off x="1947813" y="779312"/>
+          <a:off x="804862" y="3536191"/>
           <a:ext cx="1897675" cy="2194560"/>
         </p:xfrm>
         <a:graphic>
@@ -3698,179 +3784,34 @@
           </a:graphicData>
         </a:graphic>
       </p:graphicFrame>
-      <p:pic>
-        <p:nvPicPr>
-          <p:cNvPr id="10" name="Picture 9"/>
-          <p:cNvPicPr/>
-          <p:nvPr/>
-        </p:nvPicPr>
-        <p:blipFill rotWithShape="1">
-          <a:blip r:embed="rId4">
-            <a:extLst>
-              <a:ext uri="{28A0092B-C50C-407E-A947-70E740481C1C}">
-                <a14:useLocalDpi xmlns:a14="http://schemas.microsoft.com/office/drawing/2010/main" val="0"/>
-              </a:ext>
-            </a:extLst>
-          </a:blip>
-          <a:srcRect t="15233"/>
-          <a:stretch/>
-        </p:blipFill>
+      <p:sp>
+        <p:nvSpPr>
+          <p:cNvPr id="2" name="Title 1"/>
+          <p:cNvSpPr>
+            <a:spLocks noGrp="1"/>
+          </p:cNvSpPr>
+          <p:nvPr>
+            <p:ph type="title"/>
+          </p:nvPr>
+        </p:nvSpPr>
         <p:spPr>
           <a:xfrm>
-            <a:off x="21307" y="4385649"/>
-            <a:ext cx="2677795" cy="1924315"/>
+            <a:off x="838200" y="2034443"/>
+            <a:ext cx="10515600" cy="1325563"/>
           </a:xfrm>
-          <a:prstGeom prst="rect">
-            <a:avLst/>
-          </a:prstGeom>
         </p:spPr>
-      </p:pic>
-      <p:sp>
-        <p:nvSpPr>
-          <p:cNvPr id="11" name="TextBox 10"/>
-          <p:cNvSpPr txBox="1"/>
-          <p:nvPr/>
-        </p:nvSpPr>
-        <p:spPr>
-          <a:xfrm>
-            <a:off x="246853" y="3759480"/>
-            <a:ext cx="2226700" cy="369332"/>
-          </a:xfrm>
-          <a:prstGeom prst="rect">
-            <a:avLst/>
-          </a:prstGeom>
-          <a:noFill/>
-        </p:spPr>
-        <p:txBody>
-          <a:bodyPr wrap="none" rtlCol="0">
-            <a:spAutoFit/>
+        <p:txBody>
+          <a:bodyPr>
+            <a:normAutofit/>
           </a:bodyPr>
           <a:lstStyle/>
           <a:p>
-            <a:r>
-              <a:rPr lang="en-US" dirty="0"/>
-              <a:t>Traversal Visits Matrix</a:t>
-            </a:r>
-            <a:endParaRPr lang="en-US" dirty="0"/>
-          </a:p>
-        </p:txBody>
-      </p:sp>
-      <p:pic>
-        <p:nvPicPr>
-          <p:cNvPr id="12" name="Picture 11"/>
-          <p:cNvPicPr>
-            <a:picLocks noChangeAspect="1"/>
-          </p:cNvPicPr>
-          <p:nvPr/>
-        </p:nvPicPr>
-        <p:blipFill rotWithShape="1">
-          <a:blip r:embed="rId5">
-            <a:extLst>
-              <a:ext uri="{28A0092B-C50C-407E-A947-70E740481C1C}">
-                <a14:useLocalDpi xmlns:a14="http://schemas.microsoft.com/office/drawing/2010/main" val="0"/>
-              </a:ext>
-            </a:extLst>
-          </a:blip>
-          <a:srcRect l="23025" t="26863" r="22786" b="22157"/>
-          <a:stretch/>
-        </p:blipFill>
-        <p:spPr>
-          <a:xfrm>
-            <a:off x="6038633" y="4236461"/>
-            <a:ext cx="3065930" cy="2622177"/>
-          </a:xfrm>
-          <a:prstGeom prst="rect">
-            <a:avLst/>
-          </a:prstGeom>
-        </p:spPr>
-      </p:pic>
-      <p:sp>
-        <p:nvSpPr>
-          <p:cNvPr id="13" name="TextBox 12"/>
-          <p:cNvSpPr txBox="1"/>
-          <p:nvPr/>
-        </p:nvSpPr>
-        <p:spPr>
-          <a:xfrm>
-            <a:off x="3224061" y="3766751"/>
-            <a:ext cx="2369623" cy="307777"/>
-          </a:xfrm>
-          <a:prstGeom prst="rect">
-            <a:avLst/>
-          </a:prstGeom>
-          <a:noFill/>
-        </p:spPr>
-        <p:txBody>
-          <a:bodyPr wrap="none" rtlCol="0">
-            <a:spAutoFit/>
-          </a:bodyPr>
-          <a:lstStyle/>
-          <a:p>
-            <a:r>
-              <a:rPr lang="en-US" sz="1400" dirty="0"/>
-              <a:t>Visits Path starting at article A</a:t>
-            </a:r>
-            <a:endParaRPr lang="en-US" sz="1400" dirty="0"/>
-          </a:p>
-        </p:txBody>
-      </p:sp>
-      <p:sp>
-        <p:nvSpPr>
-          <p:cNvPr id="14" name="TextBox 13"/>
-          <p:cNvSpPr txBox="1"/>
-          <p:nvPr/>
-        </p:nvSpPr>
-        <p:spPr>
-          <a:xfrm>
-            <a:off x="6163489" y="3766751"/>
-            <a:ext cx="2379241" cy="307777"/>
-          </a:xfrm>
-          <a:prstGeom prst="rect">
-            <a:avLst/>
-          </a:prstGeom>
-          <a:noFill/>
-        </p:spPr>
-        <p:txBody>
-          <a:bodyPr wrap="none" rtlCol="0">
-            <a:spAutoFit/>
-          </a:bodyPr>
-          <a:lstStyle/>
-          <a:p>
-            <a:r>
-              <a:rPr lang="en-US" sz="1400" dirty="0"/>
-              <a:t>Visits Path starting at article G</a:t>
-            </a:r>
-            <a:endParaRPr lang="en-US" sz="1400" dirty="0"/>
-          </a:p>
-        </p:txBody>
-      </p:sp>
-      <p:sp>
-        <p:nvSpPr>
-          <p:cNvPr id="15" name="TextBox 14"/>
-          <p:cNvSpPr txBox="1"/>
-          <p:nvPr/>
-        </p:nvSpPr>
-        <p:spPr>
-          <a:xfrm>
-            <a:off x="4674866" y="746250"/>
-            <a:ext cx="2004780" cy="307777"/>
-          </a:xfrm>
-          <a:prstGeom prst="rect">
-            <a:avLst/>
-          </a:prstGeom>
-          <a:noFill/>
-        </p:spPr>
-        <p:txBody>
-          <a:bodyPr wrap="none" rtlCol="0">
-            <a:spAutoFit/>
-          </a:bodyPr>
-          <a:lstStyle/>
-          <a:p>
-            <a:r>
-              <a:rPr lang="en-US" sz="1400" dirty="0"/>
-              <a:t>Original Sample Network</a:t>
-            </a:r>
-            <a:endParaRPr lang="en-US" sz="1400" dirty="0"/>
+            <a:pPr algn="ctr"/>
+            <a:r>
+              <a:rPr lang="en-US" sz="2800" smtClean="0"/>
+              <a:t>Traversal Algorithm</a:t>
+            </a:r>
+            <a:endParaRPr lang="en-US" sz="2800"/>
           </a:p>
         </p:txBody>
       </p:sp>

</xml_diff>